<commit_message>
Update Proyectos Funcion Educacion.pptx
</commit_message>
<xml_diff>
--- a/Proyectos Funcion Educacion.pptx
+++ b/Proyectos Funcion Educacion.pptx
@@ -36,12 +36,12 @@
       <p:boldItalic r:id="rId19"/>
     </p:embeddedFont>
     <p:embeddedFont>
-      <p:font typeface="Lato Black" panose="020B0604020202020204" charset="0"/>
+      <p:font typeface="Lato Black" panose="020F0A02020204030203" pitchFamily="34" charset="0"/>
       <p:bold r:id="rId20"/>
       <p:boldItalic r:id="rId21"/>
     </p:embeddedFont>
     <p:embeddedFont>
-      <p:font typeface="Lato Light" panose="020B0604020202020204" charset="0"/>
+      <p:font typeface="Lato Light" panose="020F0402020204030203" pitchFamily="34" charset="0"/>
       <p:regular r:id="rId22"/>
       <p:bold r:id="rId23"/>
       <p:italic r:id="rId24"/>
@@ -6409,7 +6409,7 @@
           <p:nvPr>
             <p:extLst>
               <p:ext uri="{D42A27DB-BD31-4B8C-83A1-F6EECF244321}">
-                <p14:modId xmlns:p14="http://schemas.microsoft.com/office/powerpoint/2010/main" val="3008956458"/>
+                <p14:modId xmlns:p14="http://schemas.microsoft.com/office/powerpoint/2010/main" val="3953571924"/>
               </p:ext>
             </p:extLst>
           </p:nvPr>
@@ -6750,9 +6750,12 @@
                         <a:defRPr/>
                       </a:pPr>
                       <a:r>
-                        <a:rPr lang="es-PE" sz="800" b="0" dirty="0"/>
+                        <a:rPr lang="es-PE" sz="800" b="0" dirty="0">
+                          <a:hlinkClick r:id="rId3" action="ppaction://hlinksldjump"/>
+                        </a:rPr>
                         <a:t>MEJORAMIENTO DEL SERVICIO EDUCATIVO DEL NIVEL INICIAL N° 1105, N°92 - REYNA DE LOS ANGELES, N°1106, 812 SAN JUAN DE DIOS Y N°79 CRISTO REDENTOR EN LOS DISTRITOS DE ABANCAY , CURAHUASI Y SAN PEDRO DE CACHORA DE LA PROVINCIA DE ABANCAY - DEPARTAMENTO DE APURIMAC</a:t>
                       </a:r>
+                      <a:endParaRPr lang="es-PE" sz="800" b="0" dirty="0"/>
                     </a:p>
                   </a:txBody>
                   <a:tcPr/>
@@ -7073,6 +7076,7 @@
                             <a:srgbClr val="000000"/>
                           </a:solidFill>
                           <a:sym typeface="Arial"/>
+                          <a:hlinkClick r:id="rId4" action="ppaction://hlinksldjump"/>
                         </a:rPr>
                         <a:t>MEJORAMIENTO DE LOS SERVICIOS EDUCATIVOS INICIALES DE 10 INSTITUCIONES EDUCATIVAS DEL, DISTRITO DE TALAVERA - ANDAHUAYLAS - APURIMAC</a:t>
                       </a:r>
@@ -7337,6 +7341,7 @@
                             <a:srgbClr val="000000"/>
                           </a:solidFill>
                           <a:sym typeface="Arial"/>
+                          <a:hlinkClick r:id="rId5" action="ppaction://hlinksldjump"/>
                         </a:rPr>
                         <a:t>MEJORAMIENTO DEL INSTITUTO DE EDUCACIÓN SUPERIOR TECNOLÓGICO ALFREDO SARMIENTO PALOMINO, DISTRITO DE HUANCARAMA - PROVINCIA DE ANDAHUAYLAS - DEPARTAMENTO DE APURIMAC</a:t>
                       </a:r>
@@ -7552,6 +7557,7 @@
                             <a:srgbClr val="000000"/>
                           </a:solidFill>
                           <a:sym typeface="Arial"/>
+                          <a:hlinkClick r:id="rId6" action="ppaction://hlinksldjump"/>
                         </a:rPr>
                         <a:t>MEJORAMIENTO DEL SERVICIO EDUCATIVO DEL NIVEL INICIAL N°1135 SANGABRIEL, N°171 PICHIUPATA, N° 39 HUANCARAMA, N° 938 HUACCAYHURA, DISTRITO DE HUANCARAMA PROVINCIA DE ANDAHUAYLAS, REGION APURIMAC</a:t>
                       </a:r>
@@ -7797,6 +7803,7 @@
                             <a:srgbClr val="000000"/>
                           </a:solidFill>
                           <a:sym typeface="Arial"/>
+                          <a:hlinkClick r:id="rId7" action="ppaction://hlinksldjump"/>
                         </a:rPr>
                         <a:t>MEJORAMIENTO DEL SERVICIO EDUCATIVO DEL NIVEL INICIAL N°1005 BARRIO CENTRO DE COTABAMBAS, N°1024 CHECCHECALLA DE TAMBOBAMBA,N°716 DIVINO NIÑO JESUS DE HAQUIRA Y N°1008 CHOCHOCA DE COYLLURQUI, PROVINCIA DE COTABAMBAS, REGION APURIMAC</a:t>
                       </a:r>

</xml_diff>